<commit_message>
add pictures of services
</commit_message>
<xml_diff>
--- a/docs/logo.pptx
+++ b/docs/logo.pptx
@@ -6,6 +6,9 @@
   </p:sldMasterIdLst>
   <p:sldIdLst>
     <p:sldId id="257" r:id="rId2"/>
+    <p:sldId id="258" r:id="rId3"/>
+    <p:sldId id="259" r:id="rId4"/>
+    <p:sldId id="260" r:id="rId5"/>
   </p:sldIdLst>
   <p:sldSz cx="1800225" cy="1800225"/>
   <p:notesSz cx="6858000" cy="9144000"/>
@@ -104,6 +107,11 @@
       </a:defRPr>
     </a:lvl9pPr>
   </p:defaultTextStyle>
+  <p:extLst>
+    <p:ext uri="{EFAFB233-063F-42B5-8137-9DF3F51BA10A}">
+      <p15:sldGuideLst xmlns:p15="http://schemas.microsoft.com/office/powerpoint/2012/main"/>
+    </p:ext>
+  </p:extLst>
 </p:presentation>
 </file>
 
@@ -238,7 +246,7 @@
           <a:p>
             <a:fld id="{43698575-9C45-4C01-8596-D9A8A92F3C3A}" type="datetimeFigureOut">
               <a:rPr kumimoji="1" lang="ja-JP" altLang="en-US" smtClean="0"/>
-              <a:t>2025/6/20</a:t>
+              <a:t>2025/6/25</a:t>
             </a:fld>
             <a:endParaRPr kumimoji="1" lang="ja-JP" altLang="en-US"/>
           </a:p>
@@ -440,7 +448,7 @@
           <a:p>
             <a:fld id="{43698575-9C45-4C01-8596-D9A8A92F3C3A}" type="datetimeFigureOut">
               <a:rPr kumimoji="1" lang="ja-JP" altLang="en-US" smtClean="0"/>
-              <a:t>2025/6/20</a:t>
+              <a:t>2025/6/25</a:t>
             </a:fld>
             <a:endParaRPr kumimoji="1" lang="ja-JP" altLang="en-US"/>
           </a:p>
@@ -652,7 +660,7 @@
           <a:p>
             <a:fld id="{43698575-9C45-4C01-8596-D9A8A92F3C3A}" type="datetimeFigureOut">
               <a:rPr kumimoji="1" lang="ja-JP" altLang="en-US" smtClean="0"/>
-              <a:t>2025/6/20</a:t>
+              <a:t>2025/6/25</a:t>
             </a:fld>
             <a:endParaRPr kumimoji="1" lang="ja-JP" altLang="en-US"/>
           </a:p>
@@ -854,7 +862,7 @@
           <a:p>
             <a:fld id="{43698575-9C45-4C01-8596-D9A8A92F3C3A}" type="datetimeFigureOut">
               <a:rPr kumimoji="1" lang="ja-JP" altLang="en-US" smtClean="0"/>
-              <a:t>2025/6/20</a:t>
+              <a:t>2025/6/25</a:t>
             </a:fld>
             <a:endParaRPr kumimoji="1" lang="ja-JP" altLang="en-US"/>
           </a:p>
@@ -1098,7 +1106,7 @@
           <a:p>
             <a:fld id="{43698575-9C45-4C01-8596-D9A8A92F3C3A}" type="datetimeFigureOut">
               <a:rPr kumimoji="1" lang="ja-JP" altLang="en-US" smtClean="0"/>
-              <a:t>2025/6/20</a:t>
+              <a:t>2025/6/25</a:t>
             </a:fld>
             <a:endParaRPr kumimoji="1" lang="ja-JP" altLang="en-US"/>
           </a:p>
@@ -1394,7 +1402,7 @@
           <a:p>
             <a:fld id="{43698575-9C45-4C01-8596-D9A8A92F3C3A}" type="datetimeFigureOut">
               <a:rPr kumimoji="1" lang="ja-JP" altLang="en-US" smtClean="0"/>
-              <a:t>2025/6/20</a:t>
+              <a:t>2025/6/25</a:t>
             </a:fld>
             <a:endParaRPr kumimoji="1" lang="ja-JP" altLang="en-US"/>
           </a:p>
@@ -1825,7 +1833,7 @@
           <a:p>
             <a:fld id="{43698575-9C45-4C01-8596-D9A8A92F3C3A}" type="datetimeFigureOut">
               <a:rPr kumimoji="1" lang="ja-JP" altLang="en-US" smtClean="0"/>
-              <a:t>2025/6/20</a:t>
+              <a:t>2025/6/25</a:t>
             </a:fld>
             <a:endParaRPr kumimoji="1" lang="ja-JP" altLang="en-US"/>
           </a:p>
@@ -1943,7 +1951,7 @@
           <a:p>
             <a:fld id="{43698575-9C45-4C01-8596-D9A8A92F3C3A}" type="datetimeFigureOut">
               <a:rPr kumimoji="1" lang="ja-JP" altLang="en-US" smtClean="0"/>
-              <a:t>2025/6/20</a:t>
+              <a:t>2025/6/25</a:t>
             </a:fld>
             <a:endParaRPr kumimoji="1" lang="ja-JP" altLang="en-US"/>
           </a:p>
@@ -2038,7 +2046,7 @@
           <a:p>
             <a:fld id="{43698575-9C45-4C01-8596-D9A8A92F3C3A}" type="datetimeFigureOut">
               <a:rPr kumimoji="1" lang="ja-JP" altLang="en-US" smtClean="0"/>
-              <a:t>2025/6/20</a:t>
+              <a:t>2025/6/25</a:t>
             </a:fld>
             <a:endParaRPr kumimoji="1" lang="ja-JP" altLang="en-US"/>
           </a:p>
@@ -2347,7 +2355,7 @@
           <a:p>
             <a:fld id="{43698575-9C45-4C01-8596-D9A8A92F3C3A}" type="datetimeFigureOut">
               <a:rPr kumimoji="1" lang="ja-JP" altLang="en-US" smtClean="0"/>
-              <a:t>2025/6/20</a:t>
+              <a:t>2025/6/25</a:t>
             </a:fld>
             <a:endParaRPr kumimoji="1" lang="ja-JP" altLang="en-US"/>
           </a:p>
@@ -2604,7 +2612,7 @@
           <a:p>
             <a:fld id="{43698575-9C45-4C01-8596-D9A8A92F3C3A}" type="datetimeFigureOut">
               <a:rPr kumimoji="1" lang="ja-JP" altLang="en-US" smtClean="0"/>
-              <a:t>2025/6/20</a:t>
+              <a:t>2025/6/25</a:t>
             </a:fld>
             <a:endParaRPr kumimoji="1" lang="ja-JP" altLang="en-US"/>
           </a:p>
@@ -2849,7 +2857,7 @@
           <a:p>
             <a:fld id="{43698575-9C45-4C01-8596-D9A8A92F3C3A}" type="datetimeFigureOut">
               <a:rPr kumimoji="1" lang="ja-JP" altLang="en-US" smtClean="0"/>
-              <a:t>2025/6/20</a:t>
+              <a:t>2025/6/25</a:t>
             </a:fld>
             <a:endParaRPr kumimoji="1" lang="ja-JP" altLang="en-US"/>
           </a:p>
@@ -3389,6 +3397,434 @@
 </p:sld>
 </file>
 
+<file path=ppt/slides/slide2.xml><?xml version="1.0" encoding="utf-8"?>
+<p:sld xmlns:a="http://schemas.openxmlformats.org/drawingml/2006/main" xmlns:r="http://schemas.openxmlformats.org/officeDocument/2006/relationships" xmlns:p="http://schemas.openxmlformats.org/presentationml/2006/main">
+  <p:cSld>
+    <p:spTree>
+      <p:nvGrpSpPr>
+        <p:cNvPr id="1" name=""/>
+        <p:cNvGrpSpPr/>
+        <p:nvPr/>
+      </p:nvGrpSpPr>
+      <p:grpSpPr>
+        <a:xfrm>
+          <a:off x="0" y="0"/>
+          <a:ext cx="0" cy="0"/>
+          <a:chOff x="0" y="0"/>
+          <a:chExt cx="0" cy="0"/>
+        </a:xfrm>
+      </p:grpSpPr>
+      <p:sp>
+        <p:nvSpPr>
+          <p:cNvPr id="3" name="正方形/長方形 2">
+            <a:extLst>
+              <a:ext uri="{FF2B5EF4-FFF2-40B4-BE49-F238E27FC236}">
+                <a16:creationId xmlns:a16="http://schemas.microsoft.com/office/drawing/2014/main" id="{E2393652-A937-95EC-4FB0-B83BEB96047E}"/>
+              </a:ext>
+            </a:extLst>
+          </p:cNvPr>
+          <p:cNvSpPr/>
+          <p:nvPr/>
+        </p:nvSpPr>
+        <p:spPr>
+          <a:xfrm>
+            <a:off x="225" y="225"/>
+            <a:ext cx="1800000" cy="1800000"/>
+          </a:xfrm>
+          <a:prstGeom prst="rect">
+            <a:avLst/>
+          </a:prstGeom>
+          <a:solidFill>
+            <a:schemeClr val="accent6">
+              <a:lumMod val="20000"/>
+              <a:lumOff val="80000"/>
+            </a:schemeClr>
+          </a:solidFill>
+          <a:ln>
+            <a:noFill/>
+          </a:ln>
+        </p:spPr>
+        <p:style>
+          <a:lnRef idx="2">
+            <a:schemeClr val="accent1">
+              <a:shade val="15000"/>
+            </a:schemeClr>
+          </a:lnRef>
+          <a:fillRef idx="1">
+            <a:schemeClr val="accent1"/>
+          </a:fillRef>
+          <a:effectRef idx="0">
+            <a:schemeClr val="accent1"/>
+          </a:effectRef>
+          <a:fontRef idx="minor">
+            <a:schemeClr val="lt1"/>
+          </a:fontRef>
+        </p:style>
+        <p:txBody>
+          <a:bodyPr rtlCol="0" anchor="ctr"/>
+          <a:lstStyle/>
+          <a:p>
+            <a:pPr algn="ctr"/>
+            <a:endParaRPr kumimoji="1" lang="ja-JP" altLang="en-US"/>
+          </a:p>
+        </p:txBody>
+      </p:sp>
+      <p:sp>
+        <p:nvSpPr>
+          <p:cNvPr id="2" name="テキスト ボックス 1">
+            <a:extLst>
+              <a:ext uri="{FF2B5EF4-FFF2-40B4-BE49-F238E27FC236}">
+                <a16:creationId xmlns:a16="http://schemas.microsoft.com/office/drawing/2014/main" id="{B5F7AA40-C957-5E5D-A395-9AB5B6D8013F}"/>
+              </a:ext>
+            </a:extLst>
+          </p:cNvPr>
+          <p:cNvSpPr txBox="1"/>
+          <p:nvPr/>
+        </p:nvSpPr>
+        <p:spPr>
+          <a:xfrm>
+            <a:off x="-89903" y="700057"/>
+            <a:ext cx="1980030" cy="400110"/>
+          </a:xfrm>
+          <a:prstGeom prst="rect">
+            <a:avLst/>
+          </a:prstGeom>
+          <a:noFill/>
+        </p:spPr>
+        <p:txBody>
+          <a:bodyPr wrap="none" rtlCol="0">
+            <a:spAutoFit/>
+          </a:bodyPr>
+          <a:lstStyle/>
+          <a:p>
+            <a:pPr algn="ctr"/>
+            <a:r>
+              <a:rPr kumimoji="1" lang="ja-JP" altLang="en-US" sz="2000" dirty="0">
+                <a:solidFill>
+                  <a:schemeClr val="accent6">
+                    <a:lumMod val="50000"/>
+                  </a:schemeClr>
+                </a:solidFill>
+                <a:latin typeface="HGS創英角ﾎﾟｯﾌﾟ体" panose="040B0A00000000000000" pitchFamily="50" charset="-128"/>
+                <a:ea typeface="HGS創英角ﾎﾟｯﾌﾟ体" panose="040B0A00000000000000" pitchFamily="50" charset="-128"/>
+                <a:cs typeface="ADLaM Display" panose="02010000000000000000" pitchFamily="2" charset="0"/>
+              </a:rPr>
+              <a:t>リティーニング</a:t>
+            </a:r>
+          </a:p>
+        </p:txBody>
+      </p:sp>
+    </p:spTree>
+    <p:extLst>
+      <p:ext uri="{BB962C8B-B14F-4D97-AF65-F5344CB8AC3E}">
+        <p14:creationId xmlns:p14="http://schemas.microsoft.com/office/powerpoint/2010/main" val="2404535453"/>
+      </p:ext>
+    </p:extLst>
+  </p:cSld>
+  <p:clrMapOvr>
+    <a:masterClrMapping/>
+  </p:clrMapOvr>
+</p:sld>
+</file>
+
+<file path=ppt/slides/slide3.xml><?xml version="1.0" encoding="utf-8"?>
+<p:sld xmlns:a="http://schemas.openxmlformats.org/drawingml/2006/main" xmlns:r="http://schemas.openxmlformats.org/officeDocument/2006/relationships" xmlns:p="http://schemas.openxmlformats.org/presentationml/2006/main">
+  <p:cSld>
+    <p:spTree>
+      <p:nvGrpSpPr>
+        <p:cNvPr id="1" name="">
+          <a:extLst>
+            <a:ext uri="{FF2B5EF4-FFF2-40B4-BE49-F238E27FC236}">
+              <a16:creationId xmlns:a16="http://schemas.microsoft.com/office/drawing/2014/main" id="{55228F16-B16C-FCA5-4AFB-8338AD1E6A5F}"/>
+            </a:ext>
+          </a:extLst>
+        </p:cNvPr>
+        <p:cNvGrpSpPr/>
+        <p:nvPr/>
+      </p:nvGrpSpPr>
+      <p:grpSpPr>
+        <a:xfrm>
+          <a:off x="0" y="0"/>
+          <a:ext cx="0" cy="0"/>
+          <a:chOff x="0" y="0"/>
+          <a:chExt cx="0" cy="0"/>
+        </a:xfrm>
+      </p:grpSpPr>
+      <p:sp>
+        <p:nvSpPr>
+          <p:cNvPr id="3" name="正方形/長方形 2">
+            <a:extLst>
+              <a:ext uri="{FF2B5EF4-FFF2-40B4-BE49-F238E27FC236}">
+                <a16:creationId xmlns:a16="http://schemas.microsoft.com/office/drawing/2014/main" id="{E349A874-9A7D-16D0-E9D7-F1F1F16BB943}"/>
+              </a:ext>
+            </a:extLst>
+          </p:cNvPr>
+          <p:cNvSpPr/>
+          <p:nvPr/>
+        </p:nvSpPr>
+        <p:spPr>
+          <a:xfrm>
+            <a:off x="225" y="225"/>
+            <a:ext cx="1800000" cy="1800000"/>
+          </a:xfrm>
+          <a:prstGeom prst="rect">
+            <a:avLst/>
+          </a:prstGeom>
+          <a:solidFill>
+            <a:schemeClr val="accent6">
+              <a:lumMod val="20000"/>
+              <a:lumOff val="80000"/>
+            </a:schemeClr>
+          </a:solidFill>
+          <a:ln>
+            <a:noFill/>
+          </a:ln>
+        </p:spPr>
+        <p:style>
+          <a:lnRef idx="2">
+            <a:schemeClr val="accent1">
+              <a:shade val="15000"/>
+            </a:schemeClr>
+          </a:lnRef>
+          <a:fillRef idx="1">
+            <a:schemeClr val="accent1"/>
+          </a:fillRef>
+          <a:effectRef idx="0">
+            <a:schemeClr val="accent1"/>
+          </a:effectRef>
+          <a:fontRef idx="minor">
+            <a:schemeClr val="lt1"/>
+          </a:fontRef>
+        </p:style>
+        <p:txBody>
+          <a:bodyPr rtlCol="0" anchor="ctr"/>
+          <a:lstStyle/>
+          <a:p>
+            <a:pPr algn="ctr"/>
+            <a:endParaRPr kumimoji="1" lang="ja-JP" altLang="en-US"/>
+          </a:p>
+        </p:txBody>
+      </p:sp>
+      <p:sp>
+        <p:nvSpPr>
+          <p:cNvPr id="2" name="テキスト ボックス 1">
+            <a:extLst>
+              <a:ext uri="{FF2B5EF4-FFF2-40B4-BE49-F238E27FC236}">
+                <a16:creationId xmlns:a16="http://schemas.microsoft.com/office/drawing/2014/main" id="{70E4A27B-A6B0-ABE0-84F8-D6F77DDE58B5}"/>
+              </a:ext>
+            </a:extLst>
+          </p:cNvPr>
+          <p:cNvSpPr txBox="1"/>
+          <p:nvPr/>
+        </p:nvSpPr>
+        <p:spPr>
+          <a:xfrm>
+            <a:off x="166578" y="700057"/>
+            <a:ext cx="1467068" cy="400110"/>
+          </a:xfrm>
+          <a:prstGeom prst="rect">
+            <a:avLst/>
+          </a:prstGeom>
+          <a:noFill/>
+        </p:spPr>
+        <p:txBody>
+          <a:bodyPr wrap="none" rtlCol="0">
+            <a:spAutoFit/>
+          </a:bodyPr>
+          <a:lstStyle/>
+          <a:p>
+            <a:pPr algn="ctr"/>
+            <a:r>
+              <a:rPr kumimoji="1" lang="ja-JP" altLang="en-US" sz="2000" dirty="0">
+                <a:solidFill>
+                  <a:schemeClr val="accent6">
+                    <a:lumMod val="50000"/>
+                  </a:schemeClr>
+                </a:solidFill>
+                <a:latin typeface="HGS創英角ﾎﾟｯﾌﾟ体" panose="040B0A00000000000000" pitchFamily="50" charset="-128"/>
+                <a:ea typeface="HGS創英角ﾎﾟｯﾌﾟ体" panose="040B0A00000000000000" pitchFamily="50" charset="-128"/>
+                <a:cs typeface="ADLaM Display" panose="02010000000000000000" pitchFamily="2" charset="0"/>
+              </a:rPr>
+              <a:t>板金・塗装</a:t>
+            </a:r>
+          </a:p>
+        </p:txBody>
+      </p:sp>
+    </p:spTree>
+    <p:extLst>
+      <p:ext uri="{BB962C8B-B14F-4D97-AF65-F5344CB8AC3E}">
+        <p14:creationId xmlns:p14="http://schemas.microsoft.com/office/powerpoint/2010/main" val="2546457813"/>
+      </p:ext>
+    </p:extLst>
+  </p:cSld>
+  <p:clrMapOvr>
+    <a:masterClrMapping/>
+  </p:clrMapOvr>
+</p:sld>
+</file>
+
+<file path=ppt/slides/slide4.xml><?xml version="1.0" encoding="utf-8"?>
+<p:sld xmlns:a="http://schemas.openxmlformats.org/drawingml/2006/main" xmlns:r="http://schemas.openxmlformats.org/officeDocument/2006/relationships" xmlns:p="http://schemas.openxmlformats.org/presentationml/2006/main">
+  <p:cSld>
+    <p:spTree>
+      <p:nvGrpSpPr>
+        <p:cNvPr id="1" name="">
+          <a:extLst>
+            <a:ext uri="{FF2B5EF4-FFF2-40B4-BE49-F238E27FC236}">
+              <a16:creationId xmlns:a16="http://schemas.microsoft.com/office/drawing/2014/main" id="{C2D24038-B8BE-BC58-5DCE-936E1C03B36D}"/>
+            </a:ext>
+          </a:extLst>
+        </p:cNvPr>
+        <p:cNvGrpSpPr/>
+        <p:nvPr/>
+      </p:nvGrpSpPr>
+      <p:grpSpPr>
+        <a:xfrm>
+          <a:off x="0" y="0"/>
+          <a:ext cx="0" cy="0"/>
+          <a:chOff x="0" y="0"/>
+          <a:chExt cx="0" cy="0"/>
+        </a:xfrm>
+      </p:grpSpPr>
+      <p:sp>
+        <p:nvSpPr>
+          <p:cNvPr id="3" name="正方形/長方形 2">
+            <a:extLst>
+              <a:ext uri="{FF2B5EF4-FFF2-40B4-BE49-F238E27FC236}">
+                <a16:creationId xmlns:a16="http://schemas.microsoft.com/office/drawing/2014/main" id="{D9ACC833-4D80-8F46-7B87-F12A969990E8}"/>
+              </a:ext>
+            </a:extLst>
+          </p:cNvPr>
+          <p:cNvSpPr/>
+          <p:nvPr/>
+        </p:nvSpPr>
+        <p:spPr>
+          <a:xfrm>
+            <a:off x="225" y="225"/>
+            <a:ext cx="1800000" cy="1800000"/>
+          </a:xfrm>
+          <a:prstGeom prst="rect">
+            <a:avLst/>
+          </a:prstGeom>
+          <a:solidFill>
+            <a:schemeClr val="accent6">
+              <a:lumMod val="20000"/>
+              <a:lumOff val="80000"/>
+            </a:schemeClr>
+          </a:solidFill>
+          <a:ln>
+            <a:noFill/>
+          </a:ln>
+        </p:spPr>
+        <p:style>
+          <a:lnRef idx="2">
+            <a:schemeClr val="accent1">
+              <a:shade val="15000"/>
+            </a:schemeClr>
+          </a:lnRef>
+          <a:fillRef idx="1">
+            <a:schemeClr val="accent1"/>
+          </a:fillRef>
+          <a:effectRef idx="0">
+            <a:schemeClr val="accent1"/>
+          </a:effectRef>
+          <a:fontRef idx="minor">
+            <a:schemeClr val="lt1"/>
+          </a:fontRef>
+        </p:style>
+        <p:txBody>
+          <a:bodyPr rtlCol="0" anchor="ctr"/>
+          <a:lstStyle/>
+          <a:p>
+            <a:pPr algn="ctr"/>
+            <a:endParaRPr kumimoji="1" lang="ja-JP" altLang="en-US"/>
+          </a:p>
+        </p:txBody>
+      </p:sp>
+      <p:sp>
+        <p:nvSpPr>
+          <p:cNvPr id="2" name="テキスト ボックス 1">
+            <a:extLst>
+              <a:ext uri="{FF2B5EF4-FFF2-40B4-BE49-F238E27FC236}">
+                <a16:creationId xmlns:a16="http://schemas.microsoft.com/office/drawing/2014/main" id="{4C9704DF-4F9E-C32A-626C-DE39E1F3B521}"/>
+              </a:ext>
+            </a:extLst>
+          </p:cNvPr>
+          <p:cNvSpPr txBox="1"/>
+          <p:nvPr/>
+        </p:nvSpPr>
+        <p:spPr>
+          <a:xfrm>
+            <a:off x="-218142" y="546169"/>
+            <a:ext cx="2236510" cy="707886"/>
+          </a:xfrm>
+          <a:prstGeom prst="rect">
+            <a:avLst/>
+          </a:prstGeom>
+          <a:noFill/>
+        </p:spPr>
+        <p:txBody>
+          <a:bodyPr wrap="none" rtlCol="0">
+            <a:spAutoFit/>
+          </a:bodyPr>
+          <a:lstStyle/>
+          <a:p>
+            <a:pPr algn="ctr"/>
+            <a:r>
+              <a:rPr kumimoji="1" lang="ja-JP" altLang="en-US" sz="2000" dirty="0">
+                <a:solidFill>
+                  <a:schemeClr val="accent6">
+                    <a:lumMod val="50000"/>
+                  </a:schemeClr>
+                </a:solidFill>
+                <a:latin typeface="HGS創英角ﾎﾟｯﾌﾟ体" panose="040B0A00000000000000" pitchFamily="50" charset="-128"/>
+                <a:ea typeface="HGS創英角ﾎﾟｯﾌﾟ体" panose="040B0A00000000000000" pitchFamily="50" charset="-128"/>
+                <a:cs typeface="ADLaM Display" panose="02010000000000000000" pitchFamily="2" charset="0"/>
+              </a:rPr>
+              <a:t>その他</a:t>
+            </a:r>
+            <a:endParaRPr kumimoji="1" lang="en-US" altLang="ja-JP" sz="2000" dirty="0">
+              <a:solidFill>
+                <a:schemeClr val="accent6">
+                  <a:lumMod val="50000"/>
+                </a:schemeClr>
+              </a:solidFill>
+              <a:latin typeface="HGS創英角ﾎﾟｯﾌﾟ体" panose="040B0A00000000000000" pitchFamily="50" charset="-128"/>
+              <a:ea typeface="HGS創英角ﾎﾟｯﾌﾟ体" panose="040B0A00000000000000" pitchFamily="50" charset="-128"/>
+              <a:cs typeface="ADLaM Display" panose="02010000000000000000" pitchFamily="2" charset="0"/>
+            </a:endParaRPr>
+          </a:p>
+          <a:p>
+            <a:pPr algn="ctr"/>
+            <a:r>
+              <a:rPr kumimoji="1" lang="ja-JP" altLang="en-US" sz="2000" dirty="0">
+                <a:solidFill>
+                  <a:schemeClr val="accent6">
+                    <a:lumMod val="50000"/>
+                  </a:schemeClr>
+                </a:solidFill>
+                <a:latin typeface="HGS創英角ﾎﾟｯﾌﾟ体" panose="040B0A00000000000000" pitchFamily="50" charset="-128"/>
+                <a:ea typeface="HGS創英角ﾎﾟｯﾌﾟ体" panose="040B0A00000000000000" pitchFamily="50" charset="-128"/>
+                <a:cs typeface="ADLaM Display" panose="02010000000000000000" pitchFamily="2" charset="0"/>
+              </a:rPr>
+              <a:t>（無料相談など）</a:t>
+            </a:r>
+          </a:p>
+        </p:txBody>
+      </p:sp>
+    </p:spTree>
+    <p:extLst>
+      <p:ext uri="{BB962C8B-B14F-4D97-AF65-F5344CB8AC3E}">
+        <p14:creationId xmlns:p14="http://schemas.microsoft.com/office/powerpoint/2010/main" val="3768896132"/>
+      </p:ext>
+    </p:extLst>
+  </p:cSld>
+  <p:clrMapOvr>
+    <a:masterClrMapping/>
+  </p:clrMapOvr>
+</p:sld>
+</file>
+
 <file path=ppt/theme/theme1.xml><?xml version="1.0" encoding="utf-8"?>
 <a:theme xmlns:a="http://schemas.openxmlformats.org/drawingml/2006/main" name="Office 2013 - 2022 テーマ">
   <a:themeElements>

</xml_diff>